<commit_message>
uprava modelu (pridanie dropout)
</commit_message>
<xml_diff>
--- a/Docs/Hyperparameter Tuning in Privacy-Preserving Machine Learning.pptx
+++ b/Docs/Hyperparameter Tuning in Privacy-Preserving Machine Learning.pptx
@@ -110,6 +110,11 @@
       </a:defRPr>
     </a:lvl9pPr>
   </p:defaultTextStyle>
+  <p:extLst>
+    <p:ext uri="{EFAFB233-063F-42B5-8137-9DF3F51BA10A}">
+      <p15:sldGuideLst xmlns:p15="http://schemas.microsoft.com/office/powerpoint/2012/main"/>
+    </p:ext>
+  </p:extLst>
 </p:presentation>
 </file>
 
@@ -6040,10 +6045,10 @@
       </p:sp>
       <p:pic>
         <p:nvPicPr>
-          <p:cNvPr id="5" name="Picture 4">
+          <p:cNvPr id="6" name="Picture 5">
             <a:extLst>
               <a:ext uri="{FF2B5EF4-FFF2-40B4-BE49-F238E27FC236}">
-                <a16:creationId xmlns:a16="http://schemas.microsoft.com/office/drawing/2014/main" id="{030922EF-8A78-50E8-72DC-BA0DDE4D1AE6}"/>
+                <a16:creationId xmlns:a16="http://schemas.microsoft.com/office/drawing/2014/main" id="{BE9599BF-EA11-70FC-D601-B3947027AF62}"/>
               </a:ext>
             </a:extLst>
           </p:cNvPr>
@@ -6060,8 +6065,8 @@
         </p:blipFill>
         <p:spPr>
           <a:xfrm>
-            <a:off x="2778478" y="1436914"/>
-            <a:ext cx="6631867" cy="2053328"/>
+            <a:off x="2304918" y="1436913"/>
+            <a:ext cx="6595242" cy="2939361"/>
           </a:xfrm>
           <a:prstGeom prst="rect">
             <a:avLst/>
@@ -6203,10 +6208,10 @@
       </p:sp>
       <p:pic>
         <p:nvPicPr>
-          <p:cNvPr id="9" name="Picture 8">
+          <p:cNvPr id="5" name="Picture 4" descr="A graph with numbers and a line&#10;&#10;Description automatically generated">
             <a:extLst>
               <a:ext uri="{FF2B5EF4-FFF2-40B4-BE49-F238E27FC236}">
-                <a16:creationId xmlns:a16="http://schemas.microsoft.com/office/drawing/2014/main" id="{39800700-9F64-02DE-40EA-C94CB8B2DEA6}"/>
+                <a16:creationId xmlns:a16="http://schemas.microsoft.com/office/drawing/2014/main" id="{EB4EE90E-0558-84CD-3502-0588F71B877B}"/>
               </a:ext>
             </a:extLst>
           </p:cNvPr>
@@ -6216,15 +6221,21 @@
           <p:nvPr/>
         </p:nvPicPr>
         <p:blipFill>
-          <a:blip r:embed="rId2"/>
+          <a:blip r:embed="rId2">
+            <a:extLst>
+              <a:ext uri="{28A0092B-C50C-407E-A947-70E740481C1C}">
+                <a14:useLocalDpi xmlns:a14="http://schemas.microsoft.com/office/drawing/2010/main" val="0"/>
+              </a:ext>
+            </a:extLst>
+          </a:blip>
           <a:stretch>
             <a:fillRect/>
           </a:stretch>
         </p:blipFill>
         <p:spPr>
           <a:xfrm>
-            <a:off x="6724065" y="3509076"/>
-            <a:ext cx="4324934" cy="3175922"/>
+            <a:off x="1143001" y="3509076"/>
+            <a:ext cx="4221653" cy="3175922"/>
           </a:xfrm>
           <a:prstGeom prst="rect">
             <a:avLst/>
@@ -6233,10 +6244,10 @@
       </p:pic>
       <p:pic>
         <p:nvPicPr>
-          <p:cNvPr id="11" name="Picture 10">
+          <p:cNvPr id="7" name="Picture 6" descr="A graph with numbers and lines&#10;&#10;Description automatically generated">
             <a:extLst>
               <a:ext uri="{FF2B5EF4-FFF2-40B4-BE49-F238E27FC236}">
-                <a16:creationId xmlns:a16="http://schemas.microsoft.com/office/drawing/2014/main" id="{EE80EDED-1D0C-43F0-30F7-8C3861E1CEFA}"/>
+                <a16:creationId xmlns:a16="http://schemas.microsoft.com/office/drawing/2014/main" id="{28C48649-BB86-15AA-150F-A86059EA4E33}"/>
               </a:ext>
             </a:extLst>
           </p:cNvPr>
@@ -6246,15 +6257,21 @@
           <p:nvPr/>
         </p:nvPicPr>
         <p:blipFill>
-          <a:blip r:embed="rId3"/>
+          <a:blip r:embed="rId3">
+            <a:extLst>
+              <a:ext uri="{28A0092B-C50C-407E-A947-70E740481C1C}">
+                <a14:useLocalDpi xmlns:a14="http://schemas.microsoft.com/office/drawing/2010/main" val="0"/>
+              </a:ext>
+            </a:extLst>
+          </a:blip>
           <a:stretch>
             <a:fillRect/>
           </a:stretch>
         </p:blipFill>
         <p:spPr>
           <a:xfrm>
-            <a:off x="1246284" y="3509076"/>
-            <a:ext cx="4221652" cy="3175922"/>
+            <a:off x="6416039" y="3509076"/>
+            <a:ext cx="4632960" cy="3175922"/>
           </a:xfrm>
           <a:prstGeom prst="rect">
             <a:avLst/>

</xml_diff>